<commit_message>
change lecture 5 so order is tock, reverse, render
</commit_message>
<xml_diff>
--- a/instructor/l05/l05-pad.pptx
+++ b/instructor/l05/l05-pad.pptx
@@ -5,15 +5,16 @@
     <p:sldMasterId id="2147483648" r:id="rId1"/>
   </p:sldMasterIdLst>
   <p:notesMasterIdLst>
-    <p:notesMasterId r:id="rId8"/>
+    <p:notesMasterId r:id="rId9"/>
   </p:notesMasterIdLst>
   <p:sldIdLst>
-    <p:sldId id="259" r:id="rId2"/>
-    <p:sldId id="265" r:id="rId3"/>
-    <p:sldId id="262" r:id="rId4"/>
-    <p:sldId id="266" r:id="rId5"/>
-    <p:sldId id="263" r:id="rId6"/>
-    <p:sldId id="264" r:id="rId7"/>
+    <p:sldId id="267" r:id="rId2"/>
+    <p:sldId id="259" r:id="rId3"/>
+    <p:sldId id="265" r:id="rId4"/>
+    <p:sldId id="262" r:id="rId5"/>
+    <p:sldId id="266" r:id="rId6"/>
+    <p:sldId id="263" r:id="rId7"/>
+    <p:sldId id="264" r:id="rId8"/>
   </p:sldIdLst>
   <p:sldSz cx="12192000" cy="6858000"/>
   <p:notesSz cx="6858000" cy="9144000"/>
@@ -202,7 +203,7 @@
           <a:p>
             <a:fld id="{87B54243-B27E-4444-AFFD-D625E8407423}" type="datetimeFigureOut">
               <a:rPr lang="en-US" smtClean="0"/>
-              <a:t>1/24/23</a:t>
+              <a:t>9/21/23</a:t>
             </a:fld>
             <a:endParaRPr lang="en-US"/>
           </a:p>
@@ -534,7 +535,7 @@
           <a:p>
             <a:fld id="{BFF143C5-0C31-7047-A641-CEA71AB77CA2}" type="slidenum">
               <a:rPr lang="en-US" smtClean="0"/>
-              <a:t>1</a:t>
+              <a:t>2</a:t>
             </a:fld>
             <a:endParaRPr lang="en-US"/>
           </a:p>
@@ -618,7 +619,7 @@
           <a:p>
             <a:fld id="{BFF143C5-0C31-7047-A641-CEA71AB77CA2}" type="slidenum">
               <a:rPr lang="en-US" smtClean="0"/>
-              <a:t>2</a:t>
+              <a:t>3</a:t>
             </a:fld>
             <a:endParaRPr lang="en-US"/>
           </a:p>
@@ -702,7 +703,7 @@
           <a:p>
             <a:fld id="{BFF143C5-0C31-7047-A641-CEA71AB77CA2}" type="slidenum">
               <a:rPr lang="en-US" smtClean="0"/>
-              <a:t>3</a:t>
+              <a:t>4</a:t>
             </a:fld>
             <a:endParaRPr lang="en-US"/>
           </a:p>
@@ -786,7 +787,7 @@
           <a:p>
             <a:fld id="{BFF143C5-0C31-7047-A641-CEA71AB77CA2}" type="slidenum">
               <a:rPr lang="en-US" smtClean="0"/>
-              <a:t>4</a:t>
+              <a:t>5</a:t>
             </a:fld>
             <a:endParaRPr lang="en-US"/>
           </a:p>
@@ -952,7 +953,7 @@
           <a:p>
             <a:fld id="{7282568E-B2CD-CD42-9C3E-5F238F3D4570}" type="datetimeFigureOut">
               <a:rPr lang="en-US" smtClean="0"/>
-              <a:t>1/24/23</a:t>
+              <a:t>9/21/23</a:t>
             </a:fld>
             <a:endParaRPr lang="en-US"/>
           </a:p>
@@ -1150,7 +1151,7 @@
           <a:p>
             <a:fld id="{7282568E-B2CD-CD42-9C3E-5F238F3D4570}" type="datetimeFigureOut">
               <a:rPr lang="en-US" smtClean="0"/>
-              <a:t>1/24/23</a:t>
+              <a:t>9/21/23</a:t>
             </a:fld>
             <a:endParaRPr lang="en-US"/>
           </a:p>
@@ -1358,7 +1359,7 @@
           <a:p>
             <a:fld id="{7282568E-B2CD-CD42-9C3E-5F238F3D4570}" type="datetimeFigureOut">
               <a:rPr lang="en-US" smtClean="0"/>
-              <a:t>1/24/23</a:t>
+              <a:t>9/21/23</a:t>
             </a:fld>
             <a:endParaRPr lang="en-US"/>
           </a:p>
@@ -1556,7 +1557,7 @@
           <a:p>
             <a:fld id="{7282568E-B2CD-CD42-9C3E-5F238F3D4570}" type="datetimeFigureOut">
               <a:rPr lang="en-US" smtClean="0"/>
-              <a:t>1/24/23</a:t>
+              <a:t>9/21/23</a:t>
             </a:fld>
             <a:endParaRPr lang="en-US"/>
           </a:p>
@@ -1831,7 +1832,7 @@
           <a:p>
             <a:fld id="{7282568E-B2CD-CD42-9C3E-5F238F3D4570}" type="datetimeFigureOut">
               <a:rPr lang="en-US" smtClean="0"/>
-              <a:t>1/24/23</a:t>
+              <a:t>9/21/23</a:t>
             </a:fld>
             <a:endParaRPr lang="en-US"/>
           </a:p>
@@ -2096,7 +2097,7 @@
           <a:p>
             <a:fld id="{7282568E-B2CD-CD42-9C3E-5F238F3D4570}" type="datetimeFigureOut">
               <a:rPr lang="en-US" smtClean="0"/>
-              <a:t>1/24/23</a:t>
+              <a:t>9/21/23</a:t>
             </a:fld>
             <a:endParaRPr lang="en-US"/>
           </a:p>
@@ -2508,7 +2509,7 @@
           <a:p>
             <a:fld id="{7282568E-B2CD-CD42-9C3E-5F238F3D4570}" type="datetimeFigureOut">
               <a:rPr lang="en-US" smtClean="0"/>
-              <a:t>1/24/23</a:t>
+              <a:t>9/21/23</a:t>
             </a:fld>
             <a:endParaRPr lang="en-US"/>
           </a:p>
@@ -2649,7 +2650,7 @@
           <a:p>
             <a:fld id="{7282568E-B2CD-CD42-9C3E-5F238F3D4570}" type="datetimeFigureOut">
               <a:rPr lang="en-US" smtClean="0"/>
-              <a:t>1/24/23</a:t>
+              <a:t>9/21/23</a:t>
             </a:fld>
             <a:endParaRPr lang="en-US"/>
           </a:p>
@@ -2762,7 +2763,7 @@
           <a:p>
             <a:fld id="{7282568E-B2CD-CD42-9C3E-5F238F3D4570}" type="datetimeFigureOut">
               <a:rPr lang="en-US" smtClean="0"/>
-              <a:t>1/24/23</a:t>
+              <a:t>9/21/23</a:t>
             </a:fld>
             <a:endParaRPr lang="en-US"/>
           </a:p>
@@ -3073,7 +3074,7 @@
           <a:p>
             <a:fld id="{7282568E-B2CD-CD42-9C3E-5F238F3D4570}" type="datetimeFigureOut">
               <a:rPr lang="en-US" smtClean="0"/>
-              <a:t>1/24/23</a:t>
+              <a:t>9/21/23</a:t>
             </a:fld>
             <a:endParaRPr lang="en-US"/>
           </a:p>
@@ -3361,7 +3362,7 @@
           <a:p>
             <a:fld id="{7282568E-B2CD-CD42-9C3E-5F238F3D4570}" type="datetimeFigureOut">
               <a:rPr lang="en-US" smtClean="0"/>
-              <a:t>1/24/23</a:t>
+              <a:t>9/21/23</a:t>
             </a:fld>
             <a:endParaRPr lang="en-US"/>
           </a:p>
@@ -3602,7 +3603,7 @@
           <a:p>
             <a:fld id="{7282568E-B2CD-CD42-9C3E-5F238F3D4570}" type="datetimeFigureOut">
               <a:rPr lang="en-US" smtClean="0"/>
-              <a:t>1/24/23</a:t>
+              <a:t>9/21/23</a:t>
             </a:fld>
             <a:endParaRPr lang="en-US"/>
           </a:p>
@@ -4021,6 +4022,171 @@
       </p:grpSpPr>
       <p:sp>
         <p:nvSpPr>
+          <p:cNvPr id="3" name="Content Placeholder 2">
+            <a:extLst>
+              <a:ext uri="{FF2B5EF4-FFF2-40B4-BE49-F238E27FC236}">
+                <a16:creationId xmlns:a16="http://schemas.microsoft.com/office/drawing/2014/main" id="{ECC1CB76-CAEA-A889-40AA-55B1268B46A6}"/>
+              </a:ext>
+            </a:extLst>
+          </p:cNvPr>
+          <p:cNvSpPr>
+            <a:spLocks noGrp="1"/>
+          </p:cNvSpPr>
+          <p:nvPr>
+            <p:ph idx="1"/>
+          </p:nvPr>
+        </p:nvSpPr>
+        <p:spPr/>
+        <p:txBody>
+          <a:bodyPr>
+            <a:normAutofit lnSpcReduction="10000"/>
+          </a:bodyPr>
+          <a:lstStyle/>
+          <a:p>
+            <a:r>
+              <a:rPr lang="en-US" dirty="0"/>
+              <a:t>revising an existing program</a:t>
+            </a:r>
+          </a:p>
+          <a:p>
+            <a:pPr lvl="1"/>
+            <a:r>
+              <a:rPr lang="en-US" dirty="0"/>
+              <a:t>in this case a world program</a:t>
+            </a:r>
+          </a:p>
+          <a:p>
+            <a:pPr lvl="1"/>
+            <a:r>
+              <a:rPr lang="en-US" dirty="0"/>
+              <a:t>you will see this in problem sets 4 and 5, can also show up in exam problems</a:t>
+            </a:r>
+          </a:p>
+          <a:p>
+            <a:pPr lvl="1"/>
+            <a:r>
+              <a:rPr lang="en-US" dirty="0"/>
+              <a:t>and is nearly all of the work developers do</a:t>
+            </a:r>
+          </a:p>
+          <a:p>
+            <a:pPr lvl="1"/>
+            <a:r>
+              <a:rPr lang="en-US" dirty="0"/>
+              <a:t>as always, we will work systematically, re-running the recipes as needed</a:t>
+            </a:r>
+          </a:p>
+          <a:p>
+            <a:r>
+              <a:rPr lang="en-US" dirty="0"/>
+              <a:t>compound data</a:t>
+            </a:r>
+          </a:p>
+          <a:p>
+            <a:pPr lvl="1"/>
+            <a:r>
+              <a:rPr lang="en-US" dirty="0"/>
+              <a:t>“2 or more items of information that naturally belong together”</a:t>
+            </a:r>
+          </a:p>
+          <a:p>
+            <a:pPr lvl="1"/>
+            <a:endParaRPr lang="en-US" dirty="0"/>
+          </a:p>
+          <a:p>
+            <a:r>
+              <a:rPr lang="en-US" dirty="0"/>
+              <a:t>also, variations on enumeration templating</a:t>
+            </a:r>
+          </a:p>
+          <a:p>
+            <a:pPr lvl="1"/>
+            <a:r>
+              <a:rPr lang="en-US" dirty="0"/>
+              <a:t>large enumerations</a:t>
+            </a:r>
+          </a:p>
+          <a:p>
+            <a:pPr lvl="1"/>
+            <a:r>
+              <a:rPr lang="en-US" dirty="0"/>
+              <a:t>enumerations where an additional parameter is complex</a:t>
+            </a:r>
+          </a:p>
+          <a:p>
+            <a:pPr lvl="1"/>
+            <a:endParaRPr lang="en-US" dirty="0"/>
+          </a:p>
+        </p:txBody>
+      </p:sp>
+      <p:sp>
+        <p:nvSpPr>
+          <p:cNvPr id="4" name="TextBox 3">
+            <a:extLst>
+              <a:ext uri="{FF2B5EF4-FFF2-40B4-BE49-F238E27FC236}">
+                <a16:creationId xmlns:a16="http://schemas.microsoft.com/office/drawing/2014/main" id="{7A2CBA87-844F-1C0F-59FD-327882885A53}"/>
+              </a:ext>
+            </a:extLst>
+          </p:cNvPr>
+          <p:cNvSpPr txBox="1"/>
+          <p:nvPr/>
+        </p:nvSpPr>
+        <p:spPr>
+          <a:xfrm>
+            <a:off x="1186543" y="372808"/>
+            <a:ext cx="9873343" cy="769441"/>
+          </a:xfrm>
+          <a:prstGeom prst="rect">
+            <a:avLst/>
+          </a:prstGeom>
+          <a:noFill/>
+        </p:spPr>
+        <p:txBody>
+          <a:bodyPr wrap="square" rtlCol="0">
+            <a:spAutoFit/>
+          </a:bodyPr>
+          <a:lstStyle/>
+          <a:p>
+            <a:pPr algn="ctr"/>
+            <a:r>
+              <a:rPr lang="en-US" sz="4400" dirty="0"/>
+              <a:t>lecture 05 – 2 main topics</a:t>
+            </a:r>
+          </a:p>
+        </p:txBody>
+      </p:sp>
+    </p:spTree>
+    <p:extLst>
+      <p:ext uri="{BB962C8B-B14F-4D97-AF65-F5344CB8AC3E}">
+        <p14:creationId xmlns:p14="http://schemas.microsoft.com/office/powerpoint/2010/main" val="194659910"/>
+      </p:ext>
+    </p:extLst>
+  </p:cSld>
+  <p:clrMapOvr>
+    <a:masterClrMapping/>
+  </p:clrMapOvr>
+</p:sld>
+</file>
+
+<file path=ppt/slides/slide2.xml><?xml version="1.0" encoding="utf-8"?>
+<p:sld xmlns:a="http://schemas.openxmlformats.org/drawingml/2006/main" xmlns:r="http://schemas.openxmlformats.org/officeDocument/2006/relationships" xmlns:p="http://schemas.openxmlformats.org/presentationml/2006/main">
+  <p:cSld>
+    <p:spTree>
+      <p:nvGrpSpPr>
+        <p:cNvPr id="1" name=""/>
+        <p:cNvGrpSpPr/>
+        <p:nvPr/>
+      </p:nvGrpSpPr>
+      <p:grpSpPr>
+        <a:xfrm>
+          <a:off x="0" y="0"/>
+          <a:ext cx="0" cy="0"/>
+          <a:chOff x="0" y="0"/>
+          <a:chExt cx="0" cy="0"/>
+        </a:xfrm>
+      </p:grpSpPr>
+      <p:sp>
+        <p:nvSpPr>
           <p:cNvPr id="4" name="Rectangle 3">
             <a:extLst>
               <a:ext uri="{FF2B5EF4-FFF2-40B4-BE49-F238E27FC236}">
@@ -4914,7 +5080,7 @@
 </p:sld>
 </file>
 
-<file path=ppt/slides/slide2.xml><?xml version="1.0" encoding="utf-8"?>
+<file path=ppt/slides/slide3.xml><?xml version="1.0" encoding="utf-8"?>
 <p:sld xmlns:a="http://schemas.openxmlformats.org/drawingml/2006/main" xmlns:r="http://schemas.openxmlformats.org/officeDocument/2006/relationships" xmlns:p="http://schemas.openxmlformats.org/presentationml/2006/main">
   <p:cSld>
     <p:spTree>
@@ -6025,7 +6191,7 @@
 </p:sld>
 </file>
 
-<file path=ppt/slides/slide3.xml><?xml version="1.0" encoding="utf-8"?>
+<file path=ppt/slides/slide4.xml><?xml version="1.0" encoding="utf-8"?>
 <p:sld xmlns:a="http://schemas.openxmlformats.org/drawingml/2006/main" xmlns:r="http://schemas.openxmlformats.org/officeDocument/2006/relationships" xmlns:p="http://schemas.openxmlformats.org/presentationml/2006/main">
   <p:cSld>
     <p:spTree>
@@ -6910,7 +7076,7 @@
 </p:sld>
 </file>
 
-<file path=ppt/slides/slide4.xml><?xml version="1.0" encoding="utf-8"?>
+<file path=ppt/slides/slide5.xml><?xml version="1.0" encoding="utf-8"?>
 <p:sld xmlns:a="http://schemas.openxmlformats.org/drawingml/2006/main" xmlns:r="http://schemas.openxmlformats.org/officeDocument/2006/relationships" xmlns:p="http://schemas.openxmlformats.org/presentationml/2006/main">
   <p:cSld>
     <p:spTree>
@@ -7940,7 +8106,7 @@
 </p:sld>
 </file>
 
-<file path=ppt/slides/slide5.xml><?xml version="1.0" encoding="utf-8"?>
+<file path=ppt/slides/slide6.xml><?xml version="1.0" encoding="utf-8"?>
 <p:sld xmlns:a="http://schemas.openxmlformats.org/drawingml/2006/main" xmlns:r="http://schemas.openxmlformats.org/officeDocument/2006/relationships" xmlns:p="http://schemas.openxmlformats.org/presentationml/2006/main">
   <p:cSld>
     <p:spTree>
@@ -8020,7 +8186,7 @@
 </p:sld>
 </file>
 
-<file path=ppt/slides/slide6.xml><?xml version="1.0" encoding="utf-8"?>
+<file path=ppt/slides/slide7.xml><?xml version="1.0" encoding="utf-8"?>
 <p:sld xmlns:a="http://schemas.openxmlformats.org/drawingml/2006/main" xmlns:r="http://schemas.openxmlformats.org/officeDocument/2006/relationships" xmlns:p="http://schemas.openxmlformats.org/presentationml/2006/main">
   <p:cSld>
     <p:spTree>

</xml_diff>

<commit_message>
post lecture 5 cleanup
</commit_message>
<xml_diff>
--- a/instructor/l05/l05-pad.pptx
+++ b/instructor/l05/l05-pad.pptx
@@ -5,16 +5,18 @@
     <p:sldMasterId id="2147483648" r:id="rId1"/>
   </p:sldMasterIdLst>
   <p:notesMasterIdLst>
-    <p:notesMasterId r:id="rId9"/>
+    <p:notesMasterId r:id="rId11"/>
   </p:notesMasterIdLst>
   <p:sldIdLst>
-    <p:sldId id="267" r:id="rId2"/>
-    <p:sldId id="259" r:id="rId3"/>
-    <p:sldId id="265" r:id="rId4"/>
-    <p:sldId id="262" r:id="rId5"/>
-    <p:sldId id="266" r:id="rId6"/>
-    <p:sldId id="263" r:id="rId7"/>
-    <p:sldId id="264" r:id="rId8"/>
+    <p:sldId id="268" r:id="rId2"/>
+    <p:sldId id="267" r:id="rId3"/>
+    <p:sldId id="274" r:id="rId4"/>
+    <p:sldId id="259" r:id="rId5"/>
+    <p:sldId id="265" r:id="rId6"/>
+    <p:sldId id="262" r:id="rId7"/>
+    <p:sldId id="266" r:id="rId8"/>
+    <p:sldId id="263" r:id="rId9"/>
+    <p:sldId id="264" r:id="rId10"/>
   </p:sldIdLst>
   <p:sldSz cx="12192000" cy="6858000"/>
   <p:notesSz cx="6858000" cy="9144000"/>
@@ -535,7 +537,7 @@
           <a:p>
             <a:fld id="{BFF143C5-0C31-7047-A641-CEA71AB77CA2}" type="slidenum">
               <a:rPr lang="en-US" smtClean="0"/>
-              <a:t>2</a:t>
+              <a:t>4</a:t>
             </a:fld>
             <a:endParaRPr lang="en-US"/>
           </a:p>
@@ -619,7 +621,7 @@
           <a:p>
             <a:fld id="{BFF143C5-0C31-7047-A641-CEA71AB77CA2}" type="slidenum">
               <a:rPr lang="en-US" smtClean="0"/>
-              <a:t>3</a:t>
+              <a:t>5</a:t>
             </a:fld>
             <a:endParaRPr lang="en-US"/>
           </a:p>
@@ -703,7 +705,7 @@
           <a:p>
             <a:fld id="{BFF143C5-0C31-7047-A641-CEA71AB77CA2}" type="slidenum">
               <a:rPr lang="en-US" smtClean="0"/>
-              <a:t>4</a:t>
+              <a:t>6</a:t>
             </a:fld>
             <a:endParaRPr lang="en-US"/>
           </a:p>
@@ -787,7 +789,7 @@
           <a:p>
             <a:fld id="{BFF143C5-0C31-7047-A641-CEA71AB77CA2}" type="slidenum">
               <a:rPr lang="en-US" smtClean="0"/>
-              <a:t>5</a:t>
+              <a:t>7</a:t>
             </a:fld>
             <a:endParaRPr lang="en-US"/>
           </a:p>
@@ -4020,6 +4022,66 @@
           <a:chExt cx="0" cy="0"/>
         </a:xfrm>
       </p:grpSpPr>
+      <p:pic>
+        <p:nvPicPr>
+          <p:cNvPr id="5" name="Picture 4">
+            <a:extLst>
+              <a:ext uri="{FF2B5EF4-FFF2-40B4-BE49-F238E27FC236}">
+                <a16:creationId xmlns:a16="http://schemas.microsoft.com/office/drawing/2014/main" id="{2D000CFE-CAFD-4379-ED34-3883B125A181}"/>
+              </a:ext>
+            </a:extLst>
+          </p:cNvPr>
+          <p:cNvPicPr>
+            <a:picLocks noChangeAspect="1"/>
+          </p:cNvPicPr>
+          <p:nvPr/>
+        </p:nvPicPr>
+        <p:blipFill>
+          <a:blip r:embed="rId2"/>
+          <a:stretch>
+            <a:fillRect/>
+          </a:stretch>
+        </p:blipFill>
+        <p:spPr>
+          <a:xfrm>
+            <a:off x="2209800" y="1379163"/>
+            <a:ext cx="7772400" cy="4099673"/>
+          </a:xfrm>
+          <a:prstGeom prst="rect">
+            <a:avLst/>
+          </a:prstGeom>
+        </p:spPr>
+      </p:pic>
+    </p:spTree>
+    <p:extLst>
+      <p:ext uri="{BB962C8B-B14F-4D97-AF65-F5344CB8AC3E}">
+        <p14:creationId xmlns:p14="http://schemas.microsoft.com/office/powerpoint/2010/main" val="3630994236"/>
+      </p:ext>
+    </p:extLst>
+  </p:cSld>
+  <p:clrMapOvr>
+    <a:masterClrMapping/>
+  </p:clrMapOvr>
+</p:sld>
+</file>
+
+<file path=ppt/slides/slide2.xml><?xml version="1.0" encoding="utf-8"?>
+<p:sld xmlns:a="http://schemas.openxmlformats.org/drawingml/2006/main" xmlns:r="http://schemas.openxmlformats.org/officeDocument/2006/relationships" xmlns:p="http://schemas.openxmlformats.org/presentationml/2006/main">
+  <p:cSld>
+    <p:spTree>
+      <p:nvGrpSpPr>
+        <p:cNvPr id="1" name=""/>
+        <p:cNvGrpSpPr/>
+        <p:nvPr/>
+      </p:nvGrpSpPr>
+      <p:grpSpPr>
+        <a:xfrm>
+          <a:off x="0" y="0"/>
+          <a:ext cx="0" cy="0"/>
+          <a:chOff x="0" y="0"/>
+          <a:chExt cx="0" cy="0"/>
+        </a:xfrm>
+      </p:grpSpPr>
       <p:sp>
         <p:nvSpPr>
           <p:cNvPr id="3" name="Content Placeholder 2">
@@ -4168,7 +4230,66 @@
 </p:sld>
 </file>
 
-<file path=ppt/slides/slide2.xml><?xml version="1.0" encoding="utf-8"?>
+<file path=ppt/slides/slide3.xml><?xml version="1.0" encoding="utf-8"?>
+<p:sld xmlns:a="http://schemas.openxmlformats.org/drawingml/2006/main" xmlns:r="http://schemas.openxmlformats.org/officeDocument/2006/relationships" xmlns:p="http://schemas.openxmlformats.org/presentationml/2006/main">
+  <p:cSld>
+    <p:spTree>
+      <p:nvGrpSpPr>
+        <p:cNvPr id="1" name=""/>
+        <p:cNvGrpSpPr/>
+        <p:nvPr/>
+      </p:nvGrpSpPr>
+      <p:grpSpPr>
+        <a:xfrm>
+          <a:off x="0" y="0"/>
+          <a:ext cx="0" cy="0"/>
+          <a:chOff x="0" y="0"/>
+          <a:chExt cx="0" cy="0"/>
+        </a:xfrm>
+      </p:grpSpPr>
+      <p:pic>
+        <p:nvPicPr>
+          <p:cNvPr id="5" name="Content Placeholder 4">
+            <a:extLst>
+              <a:ext uri="{FF2B5EF4-FFF2-40B4-BE49-F238E27FC236}">
+                <a16:creationId xmlns:a16="http://schemas.microsoft.com/office/drawing/2014/main" id="{02298067-E094-36EB-E5B5-AE120961F57E}"/>
+              </a:ext>
+            </a:extLst>
+          </p:cNvPr>
+          <p:cNvPicPr>
+            <a:picLocks noGrp="1" noChangeAspect="1"/>
+          </p:cNvPicPr>
+          <p:nvPr>
+            <p:ph idx="1"/>
+          </p:nvPr>
+        </p:nvPicPr>
+        <p:blipFill>
+          <a:blip r:embed="rId2"/>
+          <a:stretch>
+            <a:fillRect/>
+          </a:stretch>
+        </p:blipFill>
+        <p:spPr>
+          <a:xfrm>
+            <a:off x="1451758" y="-159733"/>
+            <a:ext cx="9288483" cy="7177465"/>
+          </a:xfrm>
+        </p:spPr>
+      </p:pic>
+    </p:spTree>
+    <p:extLst>
+      <p:ext uri="{BB962C8B-B14F-4D97-AF65-F5344CB8AC3E}">
+        <p14:creationId xmlns:p14="http://schemas.microsoft.com/office/powerpoint/2010/main" val="2302075350"/>
+      </p:ext>
+    </p:extLst>
+  </p:cSld>
+  <p:clrMapOvr>
+    <a:masterClrMapping/>
+  </p:clrMapOvr>
+</p:sld>
+</file>
+
+<file path=ppt/slides/slide4.xml><?xml version="1.0" encoding="utf-8"?>
 <p:sld xmlns:a="http://schemas.openxmlformats.org/drawingml/2006/main" xmlns:r="http://schemas.openxmlformats.org/officeDocument/2006/relationships" xmlns:p="http://schemas.openxmlformats.org/presentationml/2006/main">
   <p:cSld>
     <p:spTree>
@@ -5080,7 +5201,7 @@
 </p:sld>
 </file>
 
-<file path=ppt/slides/slide3.xml><?xml version="1.0" encoding="utf-8"?>
+<file path=ppt/slides/slide5.xml><?xml version="1.0" encoding="utf-8"?>
 <p:sld xmlns:a="http://schemas.openxmlformats.org/drawingml/2006/main" xmlns:r="http://schemas.openxmlformats.org/officeDocument/2006/relationships" xmlns:p="http://schemas.openxmlformats.org/presentationml/2006/main">
   <p:cSld>
     <p:spTree>
@@ -6191,7 +6312,7 @@
 </p:sld>
 </file>
 
-<file path=ppt/slides/slide4.xml><?xml version="1.0" encoding="utf-8"?>
+<file path=ppt/slides/slide6.xml><?xml version="1.0" encoding="utf-8"?>
 <p:sld xmlns:a="http://schemas.openxmlformats.org/drawingml/2006/main" xmlns:r="http://schemas.openxmlformats.org/officeDocument/2006/relationships" xmlns:p="http://schemas.openxmlformats.org/presentationml/2006/main">
   <p:cSld>
     <p:spTree>
@@ -7076,7 +7197,7 @@
 </p:sld>
 </file>
 
-<file path=ppt/slides/slide5.xml><?xml version="1.0" encoding="utf-8"?>
+<file path=ppt/slides/slide7.xml><?xml version="1.0" encoding="utf-8"?>
 <p:sld xmlns:a="http://schemas.openxmlformats.org/drawingml/2006/main" xmlns:r="http://schemas.openxmlformats.org/officeDocument/2006/relationships" xmlns:p="http://schemas.openxmlformats.org/presentationml/2006/main">
   <p:cSld>
     <p:spTree>
@@ -8106,7 +8227,7 @@
 </p:sld>
 </file>
 
-<file path=ppt/slides/slide6.xml><?xml version="1.0" encoding="utf-8"?>
+<file path=ppt/slides/slide8.xml><?xml version="1.0" encoding="utf-8"?>
 <p:sld xmlns:a="http://schemas.openxmlformats.org/drawingml/2006/main" xmlns:r="http://schemas.openxmlformats.org/officeDocument/2006/relationships" xmlns:p="http://schemas.openxmlformats.org/presentationml/2006/main">
   <p:cSld>
     <p:spTree>
@@ -8186,7 +8307,7 @@
 </p:sld>
 </file>
 
-<file path=ppt/slides/slide7.xml><?xml version="1.0" encoding="utf-8"?>
+<file path=ppt/slides/slide9.xml><?xml version="1.0" encoding="utf-8"?>
 <p:sld xmlns:a="http://schemas.openxmlformats.org/drawingml/2006/main" xmlns:r="http://schemas.openxmlformats.org/officeDocument/2006/relationships" xmlns:p="http://schemas.openxmlformats.org/presentationml/2006/main">
   <p:cSld>
     <p:spTree>

</xml_diff>